<commit_message>
Azure Times 187 & 188
</commit_message>
<xml_diff>
--- a/00_presentation/2025/azureTimes188/AzureTimes_188.pptx
+++ b/00_presentation/2025/azureTimes188/AzureTimes_188.pptx
@@ -380,7 +380,7 @@
           <a:p>
             <a:fld id="{3FDC14FC-A894-4869-A797-1EC82735D106}" type="datetimeFigureOut">
               <a:rPr lang="en-US" smtClean="0"/>
-              <a:t>12/13/2025</a:t>
+              <a:t>12/15/2025</a:t>
             </a:fld>
             <a:endParaRPr lang="en-US"/>
           </a:p>
@@ -545,7 +545,7 @@
           <a:p>
             <a:fld id="{B4F99C05-63F9-4248-8E20-3ACD9DF9DE7F}" type="datetimeFigureOut">
               <a:rPr lang="en-US" smtClean="0"/>
-              <a:t>12/13/2025</a:t>
+              <a:t>12/15/2025</a:t>
             </a:fld>
             <a:endParaRPr lang="en-US"/>
           </a:p>
@@ -3455,9 +3455,18 @@
           <a:lstStyle/>
           <a:p>
             <a:r>
+              <a:rPr lang="en-US" spc="300"/>
+              <a:t>December 1</a:t>
+            </a:r>
+            <a:r>
               <a:rPr lang="en-US" spc="300" dirty="0"/>
-              <a:t>February 8, 2023</a:t>
-            </a:r>
+              <a:t>5</a:t>
+            </a:r>
+            <a:r>
+              <a:rPr lang="en-US" spc="300"/>
+              <a:t>, 2025</a:t>
+            </a:r>
+            <a:endParaRPr lang="en-US" spc="300" dirty="0"/>
           </a:p>
         </p:txBody>
       </p:sp>
@@ -7493,7 +7502,7 @@
               <a:rPr lang="en-US" dirty="0">
                 <a:hlinkClick r:id="rId2"/>
               </a:rPr>
-              <a:t>Update: The retirement date for default outbound access has been extended to March 31, 2026.</a:t>
+              <a:t>Update: The retirement date for default outbound access for Batch has been extended to March 31, 2026.</a:t>
             </a:r>
             <a:endParaRPr lang="en-US" dirty="0"/>
           </a:p>

</xml_diff>